<commit_message>
1.5.2 unit test failed
</commit_message>
<xml_diff>
--- a/src/test/resources/for-slide.pptx
+++ b/src/test/resources/for-slide.pptx
@@ -4649,10 +4649,30 @@
                   <a:txBody>
                     <a:bodyPr/>
                     <a:p>
-                      <a:pPr>
+                      <a:pPr algn="ctr">
                         <a:buNone/>
                       </a:pPr>
-                      <a:endParaRPr lang="zh-CN" altLang="en-US"/>
+                      <a:r>
+                        <a:rPr lang="zh-CN" altLang="en-US">
+                          <a:solidFill>
+                            <a:srgbClr val="FF0000"/>
+                          </a:solidFill>
+                        </a:rPr>
+                        <a:t>样式</a:t>
+                      </a:r>
+                      <a:r>
+                        <a:rPr lang="en-US" altLang="zh-CN">
+                          <a:solidFill>
+                            <a:srgbClr val="FF0000"/>
+                          </a:solidFill>
+                        </a:rPr>
+                        <a:t>1</a:t>
+                      </a:r>
+                      <a:endParaRPr lang="en-US" altLang="zh-CN">
+                        <a:solidFill>
+                          <a:srgbClr val="FF0000"/>
+                        </a:solidFill>
+                      </a:endParaRPr>
                     </a:p>
                   </a:txBody>
                   <a:tcPr/>
@@ -4664,7 +4684,30 @@
                       <a:pPr>
                         <a:buNone/>
                       </a:pPr>
-                      <a:endParaRPr lang="zh-CN" altLang="en-US"/>
+                      <a:r>
+                        <a:rPr lang="zh-CN" altLang="en-US">
+                          <a:solidFill>
+                            <a:schemeClr val="accent6"/>
+                          </a:solidFill>
+                          <a:highlight>
+                            <a:srgbClr val="FFFF00"/>
+                          </a:highlight>
+                        </a:rPr>
+                        <a:t>样式</a:t>
+                      </a:r>
+                      <a:r>
+                        <a:rPr lang="en-US" altLang="zh-CN">
+                          <a:highlight>
+                            <a:srgbClr val="FFFF00"/>
+                          </a:highlight>
+                        </a:rPr>
+                        <a:t>2</a:t>
+                      </a:r>
+                      <a:endParaRPr lang="en-US" altLang="zh-CN">
+                        <a:highlight>
+                          <a:srgbClr val="FFFF00"/>
+                        </a:highlight>
+                      </a:endParaRPr>
                     </a:p>
                   </a:txBody>
                   <a:tcPr/>
@@ -4676,7 +4719,27 @@
                       <a:pPr>
                         <a:buNone/>
                       </a:pPr>
-                      <a:endParaRPr lang="zh-CN" altLang="en-US"/>
+                      <a:r>
+                        <a:rPr lang="zh-CN" altLang="en-US">
+                          <a:solidFill>
+                            <a:schemeClr val="accent3"/>
+                          </a:solidFill>
+                        </a:rPr>
+                        <a:t>样式</a:t>
+                      </a:r>
+                      <a:r>
+                        <a:rPr lang="en-US" altLang="zh-CN">
+                          <a:solidFill>
+                            <a:schemeClr val="accent3"/>
+                          </a:solidFill>
+                        </a:rPr>
+                        <a:t>3</a:t>
+                      </a:r>
+                      <a:endParaRPr lang="en-US" altLang="zh-CN">
+                        <a:solidFill>
+                          <a:schemeClr val="accent3"/>
+                        </a:solidFill>
+                      </a:endParaRPr>
                     </a:p>
                   </a:txBody>
                   <a:tcPr/>
@@ -4776,7 +4839,15 @@
                       <a:pPr>
                         <a:buNone/>
                       </a:pPr>
-                      <a:endParaRPr lang="zh-CN" altLang="en-US"/>
+                      <a:r>
+                        <a:rPr lang="zh-CN" altLang="en-US" sz="2800"/>
+                        <a:t>样式</a:t>
+                      </a:r>
+                      <a:r>
+                        <a:rPr lang="en-US" altLang="zh-CN" sz="2800"/>
+                        <a:t>4</a:t>
+                      </a:r>
+                      <a:endParaRPr lang="en-US" altLang="zh-CN" sz="2800"/>
                     </a:p>
                   </a:txBody>
                   <a:tcPr/>
@@ -4788,7 +4859,15 @@
                       <a:pPr>
                         <a:buNone/>
                       </a:pPr>
-                      <a:endParaRPr lang="zh-CN" altLang="en-US"/>
+                      <a:r>
+                        <a:rPr lang="zh-CN" altLang="en-US" sz="1200"/>
+                        <a:t>样式</a:t>
+                      </a:r>
+                      <a:r>
+                        <a:rPr lang="en-US" altLang="zh-CN" sz="1200"/>
+                        <a:t>5</a:t>
+                      </a:r>
+                      <a:endParaRPr lang="en-US" altLang="zh-CN" sz="1200"/>
                     </a:p>
                   </a:txBody>
                   <a:tcPr/>
@@ -5879,7 +5958,7 @@
 
 <file path=ppt/tags/tag63.xml><?xml version="1.0" encoding="utf-8"?>
 <p:tagLst xmlns:p="http://schemas.openxmlformats.org/presentationml/2006/main">
-  <p:tag name="KSO_WM_UNIT_TABLE_BEAUTIFY" val="smartTable{489a96c7-8077-4269-ac95-404eeae5bd64}"/>
+  <p:tag name="KSO_WM_UNIT_TABLE_BEAUTIFY" val="smartTable{a8c0939d-5938-4522-8d2b-2afacb884dbd}"/>
   <p:tag name="TABLE_ENDDRAG_ORIGIN_RECT" val="444*221"/>
   <p:tag name="TABLE_ENDDRAG_RECT" val="483*167*444*221"/>
 </p:tagLst>
@@ -5920,7 +5999,7 @@
 <file path=ppt/tags/tag68.xml><?xml version="1.0" encoding="utf-8"?>
 <p:tagLst xmlns:p="http://schemas.openxmlformats.org/presentationml/2006/main">
   <p:tag name="COMMONDATA" val="eyJoZGlkIjoiYjBiNDk5NDhjYTE0ZDkzNWI1ODg5ZmM3NWQwODVjMDAifQ=="/>
-  <p:tag name="commondata" val="eyJoZGlkIjoiMTgwOGRmNzYxMmJjZDhiYWY5Yjg1MWFiMTZhYmI5MDgifQ=="/>
+  <p:tag name="commondata" val="eyJoZGlkIjoiNDgwODFlYzk1ZDNlMGUwOTkyZjM1YWVhYTU1NWVhMDgifQ=="/>
 </p:tagLst>
 </file>
 

</xml_diff>